<commit_message>
Remove plural 'sounds' from tinnitus comparison prompt
</commit_message>
<xml_diff>
--- a/code/experiment/fixationscreen/ppts/FollowUp_v2/FollowUp6_patient.pptx
+++ b/code/experiment/fixationscreen/ppts/FollowUp_v2/FollowUp6_patient.pptx
@@ -243,7 +243,7 @@
           <a:p>
             <a:fld id="{F9E4A943-C4ED-C543-81C6-47D1B3B03192}" type="datetimeFigureOut">
               <a:rPr lang="en-US" smtClean="0"/>
-              <a:t>2/5/24</a:t>
+              <a:t>2/16/24</a:t>
             </a:fld>
             <a:endParaRPr lang="en-US"/>
           </a:p>
@@ -413,7 +413,7 @@
           <a:p>
             <a:fld id="{F9E4A943-C4ED-C543-81C6-47D1B3B03192}" type="datetimeFigureOut">
               <a:rPr lang="en-US" smtClean="0"/>
-              <a:t>2/5/24</a:t>
+              <a:t>2/16/24</a:t>
             </a:fld>
             <a:endParaRPr lang="en-US"/>
           </a:p>
@@ -593,7 +593,7 @@
           <a:p>
             <a:fld id="{F9E4A943-C4ED-C543-81C6-47D1B3B03192}" type="datetimeFigureOut">
               <a:rPr lang="en-US" smtClean="0"/>
-              <a:t>2/5/24</a:t>
+              <a:t>2/16/24</a:t>
             </a:fld>
             <a:endParaRPr lang="en-US"/>
           </a:p>
@@ -763,7 +763,7 @@
           <a:p>
             <a:fld id="{F9E4A943-C4ED-C543-81C6-47D1B3B03192}" type="datetimeFigureOut">
               <a:rPr lang="en-US" smtClean="0"/>
-              <a:t>2/5/24</a:t>
+              <a:t>2/16/24</a:t>
             </a:fld>
             <a:endParaRPr lang="en-US"/>
           </a:p>
@@ -1009,7 +1009,7 @@
           <a:p>
             <a:fld id="{F9E4A943-C4ED-C543-81C6-47D1B3B03192}" type="datetimeFigureOut">
               <a:rPr lang="en-US" smtClean="0"/>
-              <a:t>2/5/24</a:t>
+              <a:t>2/16/24</a:t>
             </a:fld>
             <a:endParaRPr lang="en-US"/>
           </a:p>
@@ -1241,7 +1241,7 @@
           <a:p>
             <a:fld id="{F9E4A943-C4ED-C543-81C6-47D1B3B03192}" type="datetimeFigureOut">
               <a:rPr lang="en-US" smtClean="0"/>
-              <a:t>2/5/24</a:t>
+              <a:t>2/16/24</a:t>
             </a:fld>
             <a:endParaRPr lang="en-US"/>
           </a:p>
@@ -1608,7 +1608,7 @@
           <a:p>
             <a:fld id="{F9E4A943-C4ED-C543-81C6-47D1B3B03192}" type="datetimeFigureOut">
               <a:rPr lang="en-US" smtClean="0"/>
-              <a:t>2/5/24</a:t>
+              <a:t>2/16/24</a:t>
             </a:fld>
             <a:endParaRPr lang="en-US"/>
           </a:p>
@@ -1726,7 +1726,7 @@
           <a:p>
             <a:fld id="{F9E4A943-C4ED-C543-81C6-47D1B3B03192}" type="datetimeFigureOut">
               <a:rPr lang="en-US" smtClean="0"/>
-              <a:t>2/5/24</a:t>
+              <a:t>2/16/24</a:t>
             </a:fld>
             <a:endParaRPr lang="en-US"/>
           </a:p>
@@ -1821,7 +1821,7 @@
           <a:p>
             <a:fld id="{F9E4A943-C4ED-C543-81C6-47D1B3B03192}" type="datetimeFigureOut">
               <a:rPr lang="en-US" smtClean="0"/>
-              <a:t>2/5/24</a:t>
+              <a:t>2/16/24</a:t>
             </a:fld>
             <a:endParaRPr lang="en-US"/>
           </a:p>
@@ -2098,7 +2098,7 @@
           <a:p>
             <a:fld id="{F9E4A943-C4ED-C543-81C6-47D1B3B03192}" type="datetimeFigureOut">
               <a:rPr lang="en-US" smtClean="0"/>
-              <a:t>2/5/24</a:t>
+              <a:t>2/16/24</a:t>
             </a:fld>
             <a:endParaRPr lang="en-US"/>
           </a:p>
@@ -2355,7 +2355,7 @@
           <a:p>
             <a:fld id="{F9E4A943-C4ED-C543-81C6-47D1B3B03192}" type="datetimeFigureOut">
               <a:rPr lang="en-US" smtClean="0"/>
-              <a:t>2/5/24</a:t>
+              <a:t>2/16/24</a:t>
             </a:fld>
             <a:endParaRPr lang="en-US"/>
           </a:p>
@@ -2568,7 +2568,7 @@
           <a:p>
             <a:fld id="{F9E4A943-C4ED-C543-81C6-47D1B3B03192}" type="datetimeFigureOut">
               <a:rPr lang="en-US" smtClean="0"/>
-              <a:t>2/5/24</a:t>
+              <a:t>2/16/24</a:t>
             </a:fld>
             <a:endParaRPr lang="en-US"/>
           </a:p>
@@ -3017,8 +3017,21 @@
                   <a:srgbClr val="000000"/>
                 </a:solidFill>
               </a:rPr>
-              <a:t>Press F to begin. Press R to repeat the sounds.</a:t>
-            </a:r>
+              <a:t>Press F to begin. Press R to repeat </a:t>
+            </a:r>
+            <a:r>
+              <a:rPr lang="en-US" sz="2000">
+                <a:solidFill>
+                  <a:srgbClr val="000000"/>
+                </a:solidFill>
+              </a:rPr>
+              <a:t>the sound.</a:t>
+            </a:r>
+            <a:endParaRPr lang="en-US" sz="2000" dirty="0">
+              <a:solidFill>
+                <a:srgbClr val="000000"/>
+              </a:solidFill>
+            </a:endParaRPr>
           </a:p>
           <a:p>
             <a:endParaRPr lang="en-US" sz="2000" dirty="0">

</xml_diff>